<commit_message>
update state_diagram.pptx, install mongodb, add login
</commit_message>
<xml_diff>
--- a/Documents/state_diagram.pptx
+++ b/Documents/state_diagram.pptx
@@ -306,7 +306,7 @@
           <a:p>
             <a:fld id="{F90355FF-FE33-42EC-9212-B2AF526B5BE9}" type="datetimeFigureOut">
               <a:rPr lang="zh-HK" altLang="en-US" smtClean="0"/>
-              <a:t>18/11/2024</a:t>
+              <a:t>19/11/2024</a:t>
             </a:fld>
             <a:endParaRPr lang="zh-HK" altLang="en-US"/>
           </a:p>
@@ -476,7 +476,7 @@
           <a:p>
             <a:fld id="{F90355FF-FE33-42EC-9212-B2AF526B5BE9}" type="datetimeFigureOut">
               <a:rPr lang="zh-HK" altLang="en-US" smtClean="0"/>
-              <a:t>18/11/2024</a:t>
+              <a:t>19/11/2024</a:t>
             </a:fld>
             <a:endParaRPr lang="zh-HK" altLang="en-US"/>
           </a:p>
@@ -656,7 +656,7 @@
           <a:p>
             <a:fld id="{F90355FF-FE33-42EC-9212-B2AF526B5BE9}" type="datetimeFigureOut">
               <a:rPr lang="zh-HK" altLang="en-US" smtClean="0"/>
-              <a:t>18/11/2024</a:t>
+              <a:t>19/11/2024</a:t>
             </a:fld>
             <a:endParaRPr lang="zh-HK" altLang="en-US"/>
           </a:p>
@@ -826,7 +826,7 @@
           <a:p>
             <a:fld id="{F90355FF-FE33-42EC-9212-B2AF526B5BE9}" type="datetimeFigureOut">
               <a:rPr lang="zh-HK" altLang="en-US" smtClean="0"/>
-              <a:t>18/11/2024</a:t>
+              <a:t>19/11/2024</a:t>
             </a:fld>
             <a:endParaRPr lang="zh-HK" altLang="en-US"/>
           </a:p>
@@ -1072,7 +1072,7 @@
           <a:p>
             <a:fld id="{F90355FF-FE33-42EC-9212-B2AF526B5BE9}" type="datetimeFigureOut">
               <a:rPr lang="zh-HK" altLang="en-US" smtClean="0"/>
-              <a:t>18/11/2024</a:t>
+              <a:t>19/11/2024</a:t>
             </a:fld>
             <a:endParaRPr lang="zh-HK" altLang="en-US"/>
           </a:p>
@@ -1360,7 +1360,7 @@
           <a:p>
             <a:fld id="{F90355FF-FE33-42EC-9212-B2AF526B5BE9}" type="datetimeFigureOut">
               <a:rPr lang="zh-HK" altLang="en-US" smtClean="0"/>
-              <a:t>18/11/2024</a:t>
+              <a:t>19/11/2024</a:t>
             </a:fld>
             <a:endParaRPr lang="zh-HK" altLang="en-US"/>
           </a:p>
@@ -1782,7 +1782,7 @@
           <a:p>
             <a:fld id="{F90355FF-FE33-42EC-9212-B2AF526B5BE9}" type="datetimeFigureOut">
               <a:rPr lang="zh-HK" altLang="en-US" smtClean="0"/>
-              <a:t>18/11/2024</a:t>
+              <a:t>19/11/2024</a:t>
             </a:fld>
             <a:endParaRPr lang="zh-HK" altLang="en-US"/>
           </a:p>
@@ -1900,7 +1900,7 @@
           <a:p>
             <a:fld id="{F90355FF-FE33-42EC-9212-B2AF526B5BE9}" type="datetimeFigureOut">
               <a:rPr lang="zh-HK" altLang="en-US" smtClean="0"/>
-              <a:t>18/11/2024</a:t>
+              <a:t>19/11/2024</a:t>
             </a:fld>
             <a:endParaRPr lang="zh-HK" altLang="en-US"/>
           </a:p>
@@ -1995,7 +1995,7 @@
           <a:p>
             <a:fld id="{F90355FF-FE33-42EC-9212-B2AF526B5BE9}" type="datetimeFigureOut">
               <a:rPr lang="zh-HK" altLang="en-US" smtClean="0"/>
-              <a:t>18/11/2024</a:t>
+              <a:t>19/11/2024</a:t>
             </a:fld>
             <a:endParaRPr lang="zh-HK" altLang="en-US"/>
           </a:p>
@@ -2272,7 +2272,7 @@
           <a:p>
             <a:fld id="{F90355FF-FE33-42EC-9212-B2AF526B5BE9}" type="datetimeFigureOut">
               <a:rPr lang="zh-HK" altLang="en-US" smtClean="0"/>
-              <a:t>18/11/2024</a:t>
+              <a:t>19/11/2024</a:t>
             </a:fld>
             <a:endParaRPr lang="zh-HK" altLang="en-US"/>
           </a:p>
@@ -2525,7 +2525,7 @@
           <a:p>
             <a:fld id="{F90355FF-FE33-42EC-9212-B2AF526B5BE9}" type="datetimeFigureOut">
               <a:rPr lang="zh-HK" altLang="en-US" smtClean="0"/>
-              <a:t>18/11/2024</a:t>
+              <a:t>19/11/2024</a:t>
             </a:fld>
             <a:endParaRPr lang="zh-HK" altLang="en-US"/>
           </a:p>
@@ -2738,7 +2738,7 @@
           <a:p>
             <a:fld id="{F90355FF-FE33-42EC-9212-B2AF526B5BE9}" type="datetimeFigureOut">
               <a:rPr lang="zh-HK" altLang="en-US" smtClean="0"/>
-              <a:t>18/11/2024</a:t>
+              <a:t>19/11/2024</a:t>
             </a:fld>
             <a:endParaRPr lang="zh-HK" altLang="en-US"/>
           </a:p>
@@ -4598,7 +4598,7 @@
           <p:nvPr>
             <p:extLst>
               <p:ext uri="{D42A27DB-BD31-4B8C-83A1-F6EECF244321}">
-                <p14:modId xmlns:p14="http://schemas.microsoft.com/office/powerpoint/2010/main" val="918325782"/>
+                <p14:modId xmlns:p14="http://schemas.microsoft.com/office/powerpoint/2010/main" val="1622240178"/>
               </p:ext>
             </p:extLst>
           </p:nvPr>
@@ -4785,11 +4785,7 @@
                       </a:pPr>
                       <a:r>
                         <a:rPr lang="en-US" altLang="zh-HK" dirty="0" smtClean="0"/>
-                        <a:t>Use login ID to create sub-folder under </a:t>
-                      </a:r>
-                      <a:r>
-                        <a:rPr lang="en-US" altLang="zh-HK" dirty="0" smtClean="0"/>
-                        <a:t>\data\</a:t>
+                        <a:t>Use login ID to create sub-folder under \data\</a:t>
                       </a:r>
                       <a:endParaRPr lang="zh-HK" altLang="en-US" dirty="0"/>
                     </a:p>
@@ -4920,13 +4916,8 @@
                       </a:pPr>
                       <a:r>
                         <a:rPr lang="en-US" altLang="zh-HK" dirty="0" smtClean="0"/>
-                        <a:t>List out all albums available in this site (i.e. all sub-folders under </a:t>
+                        <a:t>List out all albums available in this site (i.e. all sub-folders under \data\)</a:t>
                       </a:r>
-                      <a:r>
-                        <a:rPr lang="en-US" altLang="zh-HK" dirty="0" smtClean="0"/>
-                        <a:t>\data\)</a:t>
-                      </a:r>
-                      <a:endParaRPr lang="en-US" altLang="zh-HK" dirty="0" smtClean="0"/>
                     </a:p>
                     <a:p>
                       <a:pPr marL="285750" indent="-285750">
@@ -5012,7 +5003,19 @@
                       </a:r>
                       <a:r>
                         <a:rPr lang="en-US" altLang="zh-HK" baseline="0" dirty="0" smtClean="0"/>
-                        <a:t> files under \public\images\{selected user album})</a:t>
+                        <a:t> files </a:t>
+                      </a:r>
+                      <a:r>
+                        <a:rPr lang="en-US" altLang="zh-HK" baseline="0" smtClean="0"/>
+                        <a:t>under </a:t>
+                      </a:r>
+                      <a:r>
+                        <a:rPr lang="en-US" altLang="zh-HK" baseline="0" smtClean="0"/>
+                        <a:t>\data\{</a:t>
+                      </a:r>
+                      <a:r>
+                        <a:rPr lang="en-US" altLang="zh-HK" baseline="0" dirty="0" smtClean="0"/>
+                        <a:t>selected user album})</a:t>
                       </a:r>
                     </a:p>
                     <a:p>
@@ -5343,14 +5346,7 @@
                 <a:latin typeface="Courier New" panose="02070309020205020404" pitchFamily="49" charset="0"/>
                 <a:cs typeface="Courier New" panose="02070309020205020404" pitchFamily="49" charset="0"/>
               </a:rPr>
-              <a:t>    history: [&lt;array of membership/award</a:t>
-            </a:r>
-            <a:r>
-              <a:rPr lang="en-US" altLang="zh-HK" sz="1200" dirty="0" smtClean="0">
-                <a:latin typeface="Courier New" panose="02070309020205020404" pitchFamily="49" charset="0"/>
-                <a:cs typeface="Courier New" panose="02070309020205020404" pitchFamily="49" charset="0"/>
-              </a:rPr>
-              <a:t>&gt;]</a:t>
+              <a:t>    history: [&lt;array of membership/award&gt;]</a:t>
             </a:r>
           </a:p>
           <a:p>

</xml_diff>

<commit_message>
table of content draft
</commit_message>
<xml_diff>
--- a/Documents/state_diagram.pptx
+++ b/Documents/state_diagram.pptx
@@ -306,7 +306,7 @@
           <a:p>
             <a:fld id="{F90355FF-FE33-42EC-9212-B2AF526B5BE9}" type="datetimeFigureOut">
               <a:rPr lang="zh-HK" altLang="en-US" smtClean="0"/>
-              <a:t>20/11/2024</a:t>
+              <a:t>28/11/2024</a:t>
             </a:fld>
             <a:endParaRPr lang="zh-HK" altLang="en-US"/>
           </a:p>
@@ -476,7 +476,7 @@
           <a:p>
             <a:fld id="{F90355FF-FE33-42EC-9212-B2AF526B5BE9}" type="datetimeFigureOut">
               <a:rPr lang="zh-HK" altLang="en-US" smtClean="0"/>
-              <a:t>20/11/2024</a:t>
+              <a:t>28/11/2024</a:t>
             </a:fld>
             <a:endParaRPr lang="zh-HK" altLang="en-US"/>
           </a:p>
@@ -656,7 +656,7 @@
           <a:p>
             <a:fld id="{F90355FF-FE33-42EC-9212-B2AF526B5BE9}" type="datetimeFigureOut">
               <a:rPr lang="zh-HK" altLang="en-US" smtClean="0"/>
-              <a:t>20/11/2024</a:t>
+              <a:t>28/11/2024</a:t>
             </a:fld>
             <a:endParaRPr lang="zh-HK" altLang="en-US"/>
           </a:p>
@@ -826,7 +826,7 @@
           <a:p>
             <a:fld id="{F90355FF-FE33-42EC-9212-B2AF526B5BE9}" type="datetimeFigureOut">
               <a:rPr lang="zh-HK" altLang="en-US" smtClean="0"/>
-              <a:t>20/11/2024</a:t>
+              <a:t>28/11/2024</a:t>
             </a:fld>
             <a:endParaRPr lang="zh-HK" altLang="en-US"/>
           </a:p>
@@ -1072,7 +1072,7 @@
           <a:p>
             <a:fld id="{F90355FF-FE33-42EC-9212-B2AF526B5BE9}" type="datetimeFigureOut">
               <a:rPr lang="zh-HK" altLang="en-US" smtClean="0"/>
-              <a:t>20/11/2024</a:t>
+              <a:t>28/11/2024</a:t>
             </a:fld>
             <a:endParaRPr lang="zh-HK" altLang="en-US"/>
           </a:p>
@@ -1360,7 +1360,7 @@
           <a:p>
             <a:fld id="{F90355FF-FE33-42EC-9212-B2AF526B5BE9}" type="datetimeFigureOut">
               <a:rPr lang="zh-HK" altLang="en-US" smtClean="0"/>
-              <a:t>20/11/2024</a:t>
+              <a:t>28/11/2024</a:t>
             </a:fld>
             <a:endParaRPr lang="zh-HK" altLang="en-US"/>
           </a:p>
@@ -1782,7 +1782,7 @@
           <a:p>
             <a:fld id="{F90355FF-FE33-42EC-9212-B2AF526B5BE9}" type="datetimeFigureOut">
               <a:rPr lang="zh-HK" altLang="en-US" smtClean="0"/>
-              <a:t>20/11/2024</a:t>
+              <a:t>28/11/2024</a:t>
             </a:fld>
             <a:endParaRPr lang="zh-HK" altLang="en-US"/>
           </a:p>
@@ -1900,7 +1900,7 @@
           <a:p>
             <a:fld id="{F90355FF-FE33-42EC-9212-B2AF526B5BE9}" type="datetimeFigureOut">
               <a:rPr lang="zh-HK" altLang="en-US" smtClean="0"/>
-              <a:t>20/11/2024</a:t>
+              <a:t>28/11/2024</a:t>
             </a:fld>
             <a:endParaRPr lang="zh-HK" altLang="en-US"/>
           </a:p>
@@ -1995,7 +1995,7 @@
           <a:p>
             <a:fld id="{F90355FF-FE33-42EC-9212-B2AF526B5BE9}" type="datetimeFigureOut">
               <a:rPr lang="zh-HK" altLang="en-US" smtClean="0"/>
-              <a:t>20/11/2024</a:t>
+              <a:t>28/11/2024</a:t>
             </a:fld>
             <a:endParaRPr lang="zh-HK" altLang="en-US"/>
           </a:p>
@@ -2272,7 +2272,7 @@
           <a:p>
             <a:fld id="{F90355FF-FE33-42EC-9212-B2AF526B5BE9}" type="datetimeFigureOut">
               <a:rPr lang="zh-HK" altLang="en-US" smtClean="0"/>
-              <a:t>20/11/2024</a:t>
+              <a:t>28/11/2024</a:t>
             </a:fld>
             <a:endParaRPr lang="zh-HK" altLang="en-US"/>
           </a:p>
@@ -2525,7 +2525,7 @@
           <a:p>
             <a:fld id="{F90355FF-FE33-42EC-9212-B2AF526B5BE9}" type="datetimeFigureOut">
               <a:rPr lang="zh-HK" altLang="en-US" smtClean="0"/>
-              <a:t>20/11/2024</a:t>
+              <a:t>28/11/2024</a:t>
             </a:fld>
             <a:endParaRPr lang="zh-HK" altLang="en-US"/>
           </a:p>
@@ -2738,7 +2738,7 @@
           <a:p>
             <a:fld id="{F90355FF-FE33-42EC-9212-B2AF526B5BE9}" type="datetimeFigureOut">
               <a:rPr lang="zh-HK" altLang="en-US" smtClean="0"/>
-              <a:t>20/11/2024</a:t>
+              <a:t>28/11/2024</a:t>
             </a:fld>
             <a:endParaRPr lang="zh-HK" altLang="en-US"/>
           </a:p>
@@ -5205,8 +5205,8 @@
         </p:nvSpPr>
         <p:spPr>
           <a:xfrm>
-            <a:off x="251520" y="1412776"/>
-            <a:ext cx="8640960" cy="5262979"/>
+            <a:off x="251520" y="980728"/>
+            <a:ext cx="8640960" cy="5632311"/>
           </a:xfrm>
           <a:prstGeom prst="rect">
             <a:avLst/>
@@ -5358,6 +5358,88 @@
               </a:rPr>
               <a:t>: &lt;filename&gt;</a:t>
             </a:r>
+          </a:p>
+          <a:p>
+            <a:r>
+              <a:rPr lang="en-US" altLang="zh-HK" sz="1200" dirty="0" smtClean="0">
+                <a:latin typeface="Courier New" panose="02070309020205020404" pitchFamily="49" charset="0"/>
+                <a:cs typeface="Courier New" panose="02070309020205020404" pitchFamily="49" charset="0"/>
+              </a:rPr>
+              <a:t>}</a:t>
+            </a:r>
+          </a:p>
+          <a:p>
+            <a:endParaRPr lang="en-US" altLang="zh-HK" sz="1200" dirty="0">
+              <a:latin typeface="Courier New" panose="02070309020205020404" pitchFamily="49" charset="0"/>
+              <a:cs typeface="Courier New" panose="02070309020205020404" pitchFamily="49" charset="0"/>
+            </a:endParaRPr>
+          </a:p>
+          <a:p>
+            <a:r>
+              <a:rPr lang="en-US" altLang="zh-HK" sz="1200" dirty="0" err="1">
+                <a:latin typeface="Courier New" panose="02070309020205020404" pitchFamily="49" charset="0"/>
+                <a:cs typeface="Courier New" panose="02070309020205020404" pitchFamily="49" charset="0"/>
+              </a:rPr>
+              <a:t>p</a:t>
+            </a:r>
+            <a:r>
+              <a:rPr lang="en-US" altLang="zh-HK" sz="1200" dirty="0" err="1" smtClean="0">
+                <a:latin typeface="Courier New" panose="02070309020205020404" pitchFamily="49" charset="0"/>
+                <a:cs typeface="Courier New" panose="02070309020205020404" pitchFamily="49" charset="0"/>
+              </a:rPr>
+              <a:t>hoto</a:t>
+            </a:r>
+            <a:r>
+              <a:rPr lang="en-US" altLang="zh-TW" sz="1200" dirty="0" err="1" smtClean="0">
+                <a:latin typeface="Courier New" panose="02070309020205020404" pitchFamily="49" charset="0"/>
+                <a:cs typeface="Courier New" panose="02070309020205020404" pitchFamily="49" charset="0"/>
+              </a:rPr>
+              <a:t>_</a:t>
+            </a:r>
+            <a:r>
+              <a:rPr lang="en-US" altLang="zh-HK" sz="1200" dirty="0" err="1" smtClean="0">
+                <a:latin typeface="Courier New" panose="02070309020205020404" pitchFamily="49" charset="0"/>
+                <a:cs typeface="Courier New" panose="02070309020205020404" pitchFamily="49" charset="0"/>
+              </a:rPr>
+              <a:t>collection</a:t>
+            </a:r>
+            <a:r>
+              <a:rPr lang="en-US" altLang="zh-HK" sz="1200" dirty="0" smtClean="0">
+                <a:latin typeface="Courier New" panose="02070309020205020404" pitchFamily="49" charset="0"/>
+                <a:cs typeface="Courier New" panose="02070309020205020404" pitchFamily="49" charset="0"/>
+              </a:rPr>
+              <a:t>:</a:t>
+            </a:r>
+          </a:p>
+          <a:p>
+            <a:r>
+              <a:rPr lang="en-US" altLang="zh-HK" sz="1200" dirty="0" smtClean="0">
+                <a:latin typeface="Courier New" panose="02070309020205020404" pitchFamily="49" charset="0"/>
+                <a:cs typeface="Courier New" panose="02070309020205020404" pitchFamily="49" charset="0"/>
+              </a:rPr>
+              <a:t>{   {   </a:t>
+            </a:r>
+            <a:r>
+              <a:rPr lang="en-US" altLang="zh-HK" sz="1200" dirty="0" err="1" smtClean="0">
+                <a:latin typeface="Courier New" panose="02070309020205020404" pitchFamily="49" charset="0"/>
+                <a:cs typeface="Courier New" panose="02070309020205020404" pitchFamily="49" charset="0"/>
+              </a:rPr>
+              <a:t>login_id</a:t>
+            </a:r>
+            <a:r>
+              <a:rPr lang="en-US" altLang="zh-HK" sz="1200" dirty="0" smtClean="0">
+                <a:latin typeface="Courier New" panose="02070309020205020404" pitchFamily="49" charset="0"/>
+                <a:cs typeface="Courier New" panose="02070309020205020404" pitchFamily="49" charset="0"/>
+              </a:rPr>
+              <a:t>: &lt;</a:t>
+            </a:r>
+            <a:r>
+              <a:rPr lang="en-US" altLang="zh-TW" sz="1200" dirty="0" smtClean="0">
+                <a:latin typeface="Courier New" panose="02070309020205020404" pitchFamily="49" charset="0"/>
+                <a:cs typeface="Courier New" panose="02070309020205020404" pitchFamily="49" charset="0"/>
+              </a:rPr>
+              <a:t>Login ID&gt;,</a:t>
+            </a:r>
             <a:endParaRPr lang="en-US" altLang="zh-HK" sz="1200" dirty="0" smtClean="0">
               <a:latin typeface="Courier New" panose="02070309020205020404" pitchFamily="49" charset="0"/>
               <a:cs typeface="Courier New" panose="02070309020205020404" pitchFamily="49" charset="0"/>
@@ -5369,10 +5451,22 @@
                 <a:latin typeface="Courier New" panose="02070309020205020404" pitchFamily="49" charset="0"/>
                 <a:cs typeface="Courier New" panose="02070309020205020404" pitchFamily="49" charset="0"/>
               </a:rPr>
-              <a:t>}</a:t>
-            </a:r>
-          </a:p>
-          <a:p>
+              <a:t>        filename</a:t>
+            </a:r>
+            <a:r>
+              <a:rPr lang="en-US" altLang="zh-HK" sz="1200" dirty="0">
+                <a:latin typeface="Courier New" panose="02070309020205020404" pitchFamily="49" charset="0"/>
+                <a:cs typeface="Courier New" panose="02070309020205020404" pitchFamily="49" charset="0"/>
+              </a:rPr>
+              <a:t>: </a:t>
+            </a:r>
+            <a:r>
+              <a:rPr lang="en-US" altLang="zh-HK" sz="1200" dirty="0" smtClean="0">
+                <a:latin typeface="Courier New" panose="02070309020205020404" pitchFamily="49" charset="0"/>
+                <a:cs typeface="Courier New" panose="02070309020205020404" pitchFamily="49" charset="0"/>
+              </a:rPr>
+              <a:t>&lt;Image Filename&gt;,</a:t>
+            </a:r>
             <a:endParaRPr lang="en-US" altLang="zh-HK" sz="1200" dirty="0">
               <a:latin typeface="Courier New" panose="02070309020205020404" pitchFamily="49" charset="0"/>
               <a:cs typeface="Courier New" panose="02070309020205020404" pitchFamily="49" charset="0"/>
@@ -5380,69 +5474,545 @@
           </a:p>
           <a:p>
             <a:r>
-              <a:rPr lang="en-US" altLang="zh-HK" sz="1200" dirty="0" err="1">
-                <a:latin typeface="Courier New" panose="02070309020205020404" pitchFamily="49" charset="0"/>
-                <a:cs typeface="Courier New" panose="02070309020205020404" pitchFamily="49" charset="0"/>
-              </a:rPr>
-              <a:t>p</a:t>
+              <a:rPr lang="en-US" altLang="zh-HK" sz="1200" dirty="0">
+                <a:latin typeface="Courier New" panose="02070309020205020404" pitchFamily="49" charset="0"/>
+                <a:cs typeface="Courier New" panose="02070309020205020404" pitchFamily="49" charset="0"/>
+              </a:rPr>
+              <a:t> </a:t>
+            </a:r>
+            <a:r>
+              <a:rPr lang="en-US" altLang="zh-HK" sz="1200" dirty="0" smtClean="0">
+                <a:latin typeface="Courier New" panose="02070309020205020404" pitchFamily="49" charset="0"/>
+                <a:cs typeface="Courier New" panose="02070309020205020404" pitchFamily="49" charset="0"/>
+              </a:rPr>
+              <a:t>       ISO</a:t>
+            </a:r>
+            <a:r>
+              <a:rPr lang="en-US" altLang="zh-HK" sz="1200" dirty="0">
+                <a:latin typeface="Courier New" panose="02070309020205020404" pitchFamily="49" charset="0"/>
+                <a:cs typeface="Courier New" panose="02070309020205020404" pitchFamily="49" charset="0"/>
+              </a:rPr>
+              <a:t>: </a:t>
+            </a:r>
+            <a:r>
+              <a:rPr lang="en-US" altLang="zh-HK" sz="1200" dirty="0" smtClean="0">
+                <a:latin typeface="Courier New" panose="02070309020205020404" pitchFamily="49" charset="0"/>
+                <a:cs typeface="Courier New" panose="02070309020205020404" pitchFamily="49" charset="0"/>
+              </a:rPr>
+              <a:t>&lt;ISO&gt;,</a:t>
+            </a:r>
+          </a:p>
+          <a:p>
+            <a:r>
+              <a:rPr lang="en-US" altLang="zh-HK" sz="1200" dirty="0" smtClean="0">
+                <a:latin typeface="Courier New" panose="02070309020205020404" pitchFamily="49" charset="0"/>
+                <a:cs typeface="Courier New" panose="02070309020205020404" pitchFamily="49" charset="0"/>
+              </a:rPr>
+              <a:t>        </a:t>
+            </a:r>
+            <a:r>
+              <a:rPr lang="en-US" altLang="zh-HK" sz="1200" i="1" dirty="0" smtClean="0">
+                <a:latin typeface="Courier New" panose="02070309020205020404" pitchFamily="49" charset="0"/>
+                <a:cs typeface="Courier New" panose="02070309020205020404" pitchFamily="49" charset="0"/>
+              </a:rPr>
+              <a:t>aperture</a:t>
+            </a:r>
+            <a:r>
+              <a:rPr lang="en-US" altLang="zh-HK" sz="1200" i="1" dirty="0">
+                <a:latin typeface="Courier New" panose="02070309020205020404" pitchFamily="49" charset="0"/>
+                <a:cs typeface="Courier New" panose="02070309020205020404" pitchFamily="49" charset="0"/>
+              </a:rPr>
+              <a:t>: &lt;</a:t>
+            </a:r>
+            <a:r>
+              <a:rPr lang="en-US" altLang="zh-HK" sz="1200" i="1" dirty="0" smtClean="0">
+                <a:latin typeface="Courier New" panose="02070309020205020404" pitchFamily="49" charset="0"/>
+                <a:cs typeface="Courier New" panose="02070309020205020404" pitchFamily="49" charset="0"/>
+              </a:rPr>
+              <a:t>aperture&gt;,</a:t>
+            </a:r>
+          </a:p>
+          <a:p>
+            <a:r>
+              <a:rPr lang="en-US" altLang="zh-HK" sz="1200" i="1" dirty="0" smtClean="0">
+                <a:latin typeface="Courier New" panose="02070309020205020404" pitchFamily="49" charset="0"/>
+                <a:cs typeface="Courier New" panose="02070309020205020404" pitchFamily="49" charset="0"/>
+              </a:rPr>
+              <a:t>        shutter</a:t>
+            </a:r>
+            <a:r>
+              <a:rPr lang="en-US" altLang="zh-HK" sz="1200" i="1" dirty="0">
+                <a:latin typeface="Courier New" panose="02070309020205020404" pitchFamily="49" charset="0"/>
+                <a:cs typeface="Courier New" panose="02070309020205020404" pitchFamily="49" charset="0"/>
+              </a:rPr>
+              <a:t>: &lt;</a:t>
+            </a:r>
+            <a:r>
+              <a:rPr lang="en-US" altLang="zh-HK" sz="1200" i="1" dirty="0" smtClean="0">
+                <a:latin typeface="Courier New" panose="02070309020205020404" pitchFamily="49" charset="0"/>
+                <a:cs typeface="Courier New" panose="02070309020205020404" pitchFamily="49" charset="0"/>
+              </a:rPr>
+              <a:t>shutter&gt;,</a:t>
+            </a:r>
+          </a:p>
+          <a:p>
+            <a:r>
+              <a:rPr lang="en-US" altLang="zh-HK" sz="1200" i="1" dirty="0" smtClean="0">
+                <a:latin typeface="Courier New" panose="02070309020205020404" pitchFamily="49" charset="0"/>
+                <a:cs typeface="Courier New" panose="02070309020205020404" pitchFamily="49" charset="0"/>
+              </a:rPr>
+              <a:t>        EV: &lt;EV</a:t>
+            </a:r>
+            <a:r>
+              <a:rPr lang="en-US" altLang="zh-HK" sz="1200" i="1" dirty="0" smtClean="0">
+                <a:latin typeface="Courier New" panose="02070309020205020404" pitchFamily="49" charset="0"/>
+                <a:cs typeface="Courier New" panose="02070309020205020404" pitchFamily="49" charset="0"/>
+              </a:rPr>
+              <a:t>+/-&gt;,</a:t>
+            </a:r>
+          </a:p>
+          <a:p>
+            <a:r>
+              <a:rPr lang="en-US" altLang="zh-HK" sz="1200" i="1" dirty="0" smtClean="0">
+                <a:latin typeface="Courier New" panose="02070309020205020404" pitchFamily="49" charset="0"/>
+                <a:cs typeface="Courier New" panose="02070309020205020404" pitchFamily="49" charset="0"/>
+              </a:rPr>
+              <a:t>        </a:t>
+            </a:r>
+            <a:r>
+              <a:rPr lang="en-US" altLang="zh-HK" sz="1200" i="1" dirty="0" err="1" smtClean="0">
+                <a:latin typeface="Courier New" panose="02070309020205020404" pitchFamily="49" charset="0"/>
+                <a:cs typeface="Courier New" panose="02070309020205020404" pitchFamily="49" charset="0"/>
+              </a:rPr>
+              <a:t>likeCount</a:t>
+            </a:r>
+            <a:r>
+              <a:rPr lang="en-US" altLang="zh-HK" sz="1200" i="1" dirty="0" smtClean="0">
+                <a:latin typeface="Courier New" panose="02070309020205020404" pitchFamily="49" charset="0"/>
+                <a:cs typeface="Courier New" panose="02070309020205020404" pitchFamily="49" charset="0"/>
+              </a:rPr>
+              <a:t>: &lt;Count of like&gt;,</a:t>
+            </a:r>
+          </a:p>
+          <a:p>
+            <a:r>
+              <a:rPr lang="en-US" altLang="zh-HK" sz="1200" i="1" dirty="0" smtClean="0">
+                <a:latin typeface="Courier New" panose="02070309020205020404" pitchFamily="49" charset="0"/>
+                <a:cs typeface="Courier New" panose="02070309020205020404" pitchFamily="49" charset="0"/>
+              </a:rPr>
+              <a:t>        </a:t>
+            </a:r>
+            <a:r>
+              <a:rPr lang="en-US" altLang="zh-HK" sz="1200" i="1" dirty="0" err="1" smtClean="0">
+                <a:latin typeface="Courier New" panose="02070309020205020404" pitchFamily="49" charset="0"/>
+                <a:cs typeface="Courier New" panose="02070309020205020404" pitchFamily="49" charset="0"/>
+              </a:rPr>
+              <a:t>likeBy</a:t>
+            </a:r>
+            <a:r>
+              <a:rPr lang="en-US" altLang="zh-HK" sz="1200" i="1" dirty="0" smtClean="0">
+                <a:latin typeface="Courier New" panose="02070309020205020404" pitchFamily="49" charset="0"/>
+                <a:cs typeface="Courier New" panose="02070309020205020404" pitchFamily="49" charset="0"/>
+              </a:rPr>
+              <a:t>: [&lt;array of login ID&gt;],</a:t>
+            </a:r>
+            <a:endParaRPr lang="en-US" altLang="zh-HK" sz="1200" i="1" dirty="0">
+              <a:latin typeface="Courier New" panose="02070309020205020404" pitchFamily="49" charset="0"/>
+              <a:cs typeface="Courier New" panose="02070309020205020404" pitchFamily="49" charset="0"/>
+            </a:endParaRPr>
+          </a:p>
+          <a:p>
+            <a:r>
+              <a:rPr lang="en-US" altLang="zh-HK" sz="1200" dirty="0" smtClean="0">
+                <a:latin typeface="Courier New" panose="02070309020205020404" pitchFamily="49" charset="0"/>
+                <a:cs typeface="Courier New" panose="02070309020205020404" pitchFamily="49" charset="0"/>
+              </a:rPr>
+              <a:t>        raw1: {filename:&lt;filename&gt;, ISO:…, aperture:…, </a:t>
+            </a:r>
+            <a:r>
+              <a:rPr lang="en-US" altLang="zh-HK" sz="1200" dirty="0">
+                <a:latin typeface="Courier New" panose="02070309020205020404" pitchFamily="49" charset="0"/>
+                <a:cs typeface="Courier New" panose="02070309020205020404" pitchFamily="49" charset="0"/>
+              </a:rPr>
+              <a:t>shutter</a:t>
+            </a:r>
+            <a:r>
+              <a:rPr lang="en-US" altLang="zh-HK" sz="1200" dirty="0" smtClean="0">
+                <a:latin typeface="Courier New" panose="02070309020205020404" pitchFamily="49" charset="0"/>
+                <a:cs typeface="Courier New" panose="02070309020205020404" pitchFamily="49" charset="0"/>
+              </a:rPr>
+              <a:t>:…, </a:t>
+            </a:r>
+            <a:r>
+              <a:rPr lang="en-US" altLang="zh-HK" sz="1200" dirty="0">
+                <a:latin typeface="Courier New" panose="02070309020205020404" pitchFamily="49" charset="0"/>
+                <a:cs typeface="Courier New" panose="02070309020205020404" pitchFamily="49" charset="0"/>
+              </a:rPr>
+              <a:t>EV</a:t>
+            </a:r>
+            <a:r>
+              <a:rPr lang="en-US" altLang="zh-HK" sz="1200" dirty="0" smtClean="0">
+                <a:latin typeface="Courier New" panose="02070309020205020404" pitchFamily="49" charset="0"/>
+                <a:cs typeface="Courier New" panose="02070309020205020404" pitchFamily="49" charset="0"/>
+              </a:rPr>
+              <a:t>:… },</a:t>
+            </a:r>
+            <a:endParaRPr lang="en-US" altLang="zh-HK" sz="1200" dirty="0">
+              <a:latin typeface="Courier New" panose="02070309020205020404" pitchFamily="49" charset="0"/>
+              <a:cs typeface="Courier New" panose="02070309020205020404" pitchFamily="49" charset="0"/>
+            </a:endParaRPr>
+          </a:p>
+          <a:p>
+            <a:r>
+              <a:rPr lang="en-US" altLang="zh-HK" sz="1200" dirty="0">
+                <a:latin typeface="Courier New" panose="02070309020205020404" pitchFamily="49" charset="0"/>
+                <a:cs typeface="Courier New" panose="02070309020205020404" pitchFamily="49" charset="0"/>
+              </a:rPr>
+              <a:t> </a:t>
+            </a:r>
+            <a:r>
+              <a:rPr lang="en-US" altLang="zh-HK" sz="1200" dirty="0" smtClean="0">
+                <a:latin typeface="Courier New" panose="02070309020205020404" pitchFamily="49" charset="0"/>
+                <a:cs typeface="Courier New" panose="02070309020205020404" pitchFamily="49" charset="0"/>
+              </a:rPr>
+              <a:t>       raw2: {filename:&lt;filename</a:t>
+            </a:r>
+            <a:r>
+              <a:rPr lang="en-US" altLang="zh-HK" sz="1200" dirty="0">
+                <a:latin typeface="Courier New" panose="02070309020205020404" pitchFamily="49" charset="0"/>
+                <a:cs typeface="Courier New" panose="02070309020205020404" pitchFamily="49" charset="0"/>
+              </a:rPr>
+              <a:t>&gt;, ISO</a:t>
+            </a:r>
+            <a:r>
+              <a:rPr lang="en-US" altLang="zh-HK" sz="1200" dirty="0" smtClean="0">
+                <a:latin typeface="Courier New" panose="02070309020205020404" pitchFamily="49" charset="0"/>
+                <a:cs typeface="Courier New" panose="02070309020205020404" pitchFamily="49" charset="0"/>
+              </a:rPr>
+              <a:t>:…, </a:t>
+            </a:r>
+            <a:r>
+              <a:rPr lang="en-US" altLang="zh-HK" sz="1200" dirty="0">
+                <a:latin typeface="Courier New" panose="02070309020205020404" pitchFamily="49" charset="0"/>
+                <a:cs typeface="Courier New" panose="02070309020205020404" pitchFamily="49" charset="0"/>
+              </a:rPr>
+              <a:t>aperture</a:t>
+            </a:r>
+            <a:r>
+              <a:rPr lang="en-US" altLang="zh-HK" sz="1200" dirty="0" smtClean="0">
+                <a:latin typeface="Courier New" panose="02070309020205020404" pitchFamily="49" charset="0"/>
+                <a:cs typeface="Courier New" panose="02070309020205020404" pitchFamily="49" charset="0"/>
+              </a:rPr>
+              <a:t>:…, </a:t>
+            </a:r>
+            <a:r>
+              <a:rPr lang="en-US" altLang="zh-HK" sz="1200" dirty="0">
+                <a:latin typeface="Courier New" panose="02070309020205020404" pitchFamily="49" charset="0"/>
+                <a:cs typeface="Courier New" panose="02070309020205020404" pitchFamily="49" charset="0"/>
+              </a:rPr>
+              <a:t>shutter</a:t>
+            </a:r>
+            <a:r>
+              <a:rPr lang="en-US" altLang="zh-HK" sz="1200" dirty="0" smtClean="0">
+                <a:latin typeface="Courier New" panose="02070309020205020404" pitchFamily="49" charset="0"/>
+                <a:cs typeface="Courier New" panose="02070309020205020404" pitchFamily="49" charset="0"/>
+              </a:rPr>
+              <a:t>:…, </a:t>
+            </a:r>
+            <a:r>
+              <a:rPr lang="en-US" altLang="zh-HK" sz="1200" dirty="0">
+                <a:latin typeface="Courier New" panose="02070309020205020404" pitchFamily="49" charset="0"/>
+                <a:cs typeface="Courier New" panose="02070309020205020404" pitchFamily="49" charset="0"/>
+              </a:rPr>
+              <a:t>EV</a:t>
+            </a:r>
+            <a:r>
+              <a:rPr lang="en-US" altLang="zh-HK" sz="1200" dirty="0" smtClean="0">
+                <a:latin typeface="Courier New" panose="02070309020205020404" pitchFamily="49" charset="0"/>
+                <a:cs typeface="Courier New" panose="02070309020205020404" pitchFamily="49" charset="0"/>
+              </a:rPr>
+              <a:t>:… }</a:t>
+            </a:r>
+          </a:p>
+          <a:p>
+            <a:r>
+              <a:rPr lang="en-US" altLang="zh-HK" sz="1200" dirty="0">
+                <a:latin typeface="Courier New" panose="02070309020205020404" pitchFamily="49" charset="0"/>
+                <a:cs typeface="Courier New" panose="02070309020205020404" pitchFamily="49" charset="0"/>
+              </a:rPr>
+              <a:t> </a:t>
+            </a:r>
+            <a:r>
+              <a:rPr lang="en-US" altLang="zh-HK" sz="1200" dirty="0" smtClean="0">
+                <a:latin typeface="Courier New" panose="02070309020205020404" pitchFamily="49" charset="0"/>
+                <a:cs typeface="Courier New" panose="02070309020205020404" pitchFamily="49" charset="0"/>
+              </a:rPr>
+              <a:t>   },</a:t>
+            </a:r>
+            <a:endParaRPr lang="en-US" altLang="zh-HK" sz="1200" dirty="0">
+              <a:latin typeface="Courier New" panose="02070309020205020404" pitchFamily="49" charset="0"/>
+              <a:cs typeface="Courier New" panose="02070309020205020404" pitchFamily="49" charset="0"/>
+            </a:endParaRPr>
+          </a:p>
+          <a:p>
+            <a:r>
+              <a:rPr lang="en-US" altLang="zh-HK" sz="1200" dirty="0" smtClean="0">
+                <a:latin typeface="Courier New" panose="02070309020205020404" pitchFamily="49" charset="0"/>
+                <a:cs typeface="Courier New" panose="02070309020205020404" pitchFamily="49" charset="0"/>
+              </a:rPr>
+              <a:t>    {   </a:t>
             </a:r>
             <a:r>
               <a:rPr lang="en-US" altLang="zh-HK" sz="1200" dirty="0" err="1" smtClean="0">
                 <a:latin typeface="Courier New" panose="02070309020205020404" pitchFamily="49" charset="0"/>
                 <a:cs typeface="Courier New" panose="02070309020205020404" pitchFamily="49" charset="0"/>
               </a:rPr>
-              <a:t>hoto</a:t>
-            </a:r>
-            <a:r>
-              <a:rPr lang="en-US" altLang="zh-TW" sz="1200" dirty="0" err="1" smtClean="0">
-                <a:latin typeface="Courier New" panose="02070309020205020404" pitchFamily="49" charset="0"/>
-                <a:cs typeface="Courier New" panose="02070309020205020404" pitchFamily="49" charset="0"/>
-              </a:rPr>
-              <a:t>_</a:t>
-            </a:r>
-            <a:r>
-              <a:rPr lang="en-US" altLang="zh-HK" sz="1200" dirty="0" err="1" smtClean="0">
-                <a:latin typeface="Courier New" panose="02070309020205020404" pitchFamily="49" charset="0"/>
-                <a:cs typeface="Courier New" panose="02070309020205020404" pitchFamily="49" charset="0"/>
-              </a:rPr>
-              <a:t>collection</a:t>
+              <a:t>login_id</a:t>
             </a:r>
             <a:r>
               <a:rPr lang="en-US" altLang="zh-HK" sz="1200" dirty="0" smtClean="0">
                 <a:latin typeface="Courier New" panose="02070309020205020404" pitchFamily="49" charset="0"/>
                 <a:cs typeface="Courier New" panose="02070309020205020404" pitchFamily="49" charset="0"/>
               </a:rPr>
-              <a:t>:</a:t>
-            </a:r>
-          </a:p>
-          <a:p>
+              <a:t>: “john”,</a:t>
+            </a:r>
+          </a:p>
+          <a:p>
+            <a:r>
+              <a:rPr lang="en-US" altLang="zh-HK" sz="1200" dirty="0">
+                <a:latin typeface="Courier New" panose="02070309020205020404" pitchFamily="49" charset="0"/>
+                <a:cs typeface="Courier New" panose="02070309020205020404" pitchFamily="49" charset="0"/>
+              </a:rPr>
+              <a:t> </a:t>
+            </a:r>
             <a:r>
               <a:rPr lang="en-US" altLang="zh-HK" sz="1200" dirty="0" smtClean="0">
                 <a:latin typeface="Courier New" panose="02070309020205020404" pitchFamily="49" charset="0"/>
                 <a:cs typeface="Courier New" panose="02070309020205020404" pitchFamily="49" charset="0"/>
               </a:rPr>
-              <a:t>{   {   </a:t>
-            </a:r>
-            <a:r>
-              <a:rPr lang="en-US" altLang="zh-HK" sz="1200" dirty="0" err="1" smtClean="0">
-                <a:latin typeface="Courier New" panose="02070309020205020404" pitchFamily="49" charset="0"/>
-                <a:cs typeface="Courier New" panose="02070309020205020404" pitchFamily="49" charset="0"/>
-              </a:rPr>
-              <a:t>login_id</a:t>
+              <a:t>       filename</a:t>
+            </a:r>
+            <a:r>
+              <a:rPr lang="en-US" altLang="zh-HK" sz="1200" dirty="0">
+                <a:latin typeface="Courier New" panose="02070309020205020404" pitchFamily="49" charset="0"/>
+                <a:cs typeface="Courier New" panose="02070309020205020404" pitchFamily="49" charset="0"/>
+              </a:rPr>
+              <a:t>: </a:t>
             </a:r>
             <a:r>
               <a:rPr lang="en-US" altLang="zh-HK" sz="1200" dirty="0" smtClean="0">
                 <a:latin typeface="Courier New" panose="02070309020205020404" pitchFamily="49" charset="0"/>
                 <a:cs typeface="Courier New" panose="02070309020205020404" pitchFamily="49" charset="0"/>
               </a:rPr>
-              <a:t>: &lt;</a:t>
-            </a:r>
-            <a:r>
-              <a:rPr lang="en-US" altLang="zh-TW" sz="1200" dirty="0" smtClean="0">
-                <a:latin typeface="Courier New" panose="02070309020205020404" pitchFamily="49" charset="0"/>
-                <a:cs typeface="Courier New" panose="02070309020205020404" pitchFamily="49" charset="0"/>
-              </a:rPr>
-              <a:t>Login ID&gt;,</a:t>
+              <a:t>“scene.jpg”,</a:t>
+            </a:r>
+            <a:endParaRPr lang="en-US" altLang="zh-HK" sz="1200" dirty="0">
+              <a:latin typeface="Courier New" panose="02070309020205020404" pitchFamily="49" charset="0"/>
+              <a:cs typeface="Courier New" panose="02070309020205020404" pitchFamily="49" charset="0"/>
+            </a:endParaRPr>
+          </a:p>
+          <a:p>
+            <a:r>
+              <a:rPr lang="en-US" altLang="zh-HK" sz="1200" dirty="0" smtClean="0">
+                <a:latin typeface="Courier New" panose="02070309020205020404" pitchFamily="49" charset="0"/>
+                <a:cs typeface="Courier New" panose="02070309020205020404" pitchFamily="49" charset="0"/>
+              </a:rPr>
+              <a:t>        ISO: 100,</a:t>
+            </a:r>
+          </a:p>
+          <a:p>
+            <a:r>
+              <a:rPr lang="en-US" altLang="zh-HK" sz="1200" dirty="0" smtClean="0">
+                <a:latin typeface="Courier New" panose="02070309020205020404" pitchFamily="49" charset="0"/>
+                <a:cs typeface="Courier New" panose="02070309020205020404" pitchFamily="49" charset="0"/>
+              </a:rPr>
+              <a:t>        </a:t>
+            </a:r>
+            <a:r>
+              <a:rPr lang="en-US" altLang="zh-HK" sz="1200" i="1" dirty="0" smtClean="0">
+                <a:latin typeface="Courier New" panose="02070309020205020404" pitchFamily="49" charset="0"/>
+                <a:cs typeface="Courier New" panose="02070309020205020404" pitchFamily="49" charset="0"/>
+              </a:rPr>
+              <a:t>aperture</a:t>
+            </a:r>
+            <a:r>
+              <a:rPr lang="en-US" altLang="zh-HK" sz="1200" i="1" dirty="0">
+                <a:latin typeface="Courier New" panose="02070309020205020404" pitchFamily="49" charset="0"/>
+                <a:cs typeface="Courier New" panose="02070309020205020404" pitchFamily="49" charset="0"/>
+              </a:rPr>
+              <a:t>: </a:t>
+            </a:r>
+            <a:r>
+              <a:rPr lang="en-US" altLang="zh-HK" sz="1200" i="1" dirty="0" smtClean="0">
+                <a:latin typeface="Courier New" panose="02070309020205020404" pitchFamily="49" charset="0"/>
+                <a:cs typeface="Courier New" panose="02070309020205020404" pitchFamily="49" charset="0"/>
+              </a:rPr>
+              <a:t>8,</a:t>
+            </a:r>
+            <a:endParaRPr lang="en-US" altLang="zh-HK" sz="1200" i="1" dirty="0">
+              <a:latin typeface="Courier New" panose="02070309020205020404" pitchFamily="49" charset="0"/>
+              <a:cs typeface="Courier New" panose="02070309020205020404" pitchFamily="49" charset="0"/>
+            </a:endParaRPr>
+          </a:p>
+          <a:p>
+            <a:r>
+              <a:rPr lang="en-US" altLang="zh-HK" sz="1200" i="1" dirty="0" smtClean="0">
+                <a:latin typeface="Courier New" panose="02070309020205020404" pitchFamily="49" charset="0"/>
+                <a:cs typeface="Courier New" panose="02070309020205020404" pitchFamily="49" charset="0"/>
+              </a:rPr>
+              <a:t>        shutter</a:t>
+            </a:r>
+            <a:r>
+              <a:rPr lang="en-US" altLang="zh-HK" sz="1200" i="1" dirty="0">
+                <a:latin typeface="Courier New" panose="02070309020205020404" pitchFamily="49" charset="0"/>
+                <a:cs typeface="Courier New" panose="02070309020205020404" pitchFamily="49" charset="0"/>
+              </a:rPr>
+              <a:t>: </a:t>
+            </a:r>
+            <a:r>
+              <a:rPr lang="en-US" altLang="zh-HK" sz="1200" dirty="0" smtClean="0">
+                <a:latin typeface="Courier New" panose="02070309020205020404" pitchFamily="49" charset="0"/>
+                <a:cs typeface="Courier New" panose="02070309020205020404" pitchFamily="49" charset="0"/>
+              </a:rPr>
+              <a:t>“1</a:t>
+            </a:r>
+            <a:r>
+              <a:rPr lang="en-US" altLang="zh-HK" sz="1200" i="1" dirty="0" smtClean="0">
+                <a:latin typeface="Courier New" panose="02070309020205020404" pitchFamily="49" charset="0"/>
+                <a:cs typeface="Courier New" panose="02070309020205020404" pitchFamily="49" charset="0"/>
+              </a:rPr>
+              <a:t>/200”,</a:t>
+            </a:r>
+            <a:endParaRPr lang="en-US" altLang="zh-HK" sz="1200" i="1" dirty="0">
+              <a:latin typeface="Courier New" panose="02070309020205020404" pitchFamily="49" charset="0"/>
+              <a:cs typeface="Courier New" panose="02070309020205020404" pitchFamily="49" charset="0"/>
+            </a:endParaRPr>
+          </a:p>
+          <a:p>
+            <a:r>
+              <a:rPr lang="en-US" altLang="zh-HK" sz="1200" i="1" dirty="0" smtClean="0">
+                <a:latin typeface="Courier New" panose="02070309020205020404" pitchFamily="49" charset="0"/>
+                <a:cs typeface="Courier New" panose="02070309020205020404" pitchFamily="49" charset="0"/>
+              </a:rPr>
+              <a:t>        EV</a:t>
+            </a:r>
+            <a:r>
+              <a:rPr lang="en-US" altLang="zh-HK" sz="1200" i="1" dirty="0">
+                <a:latin typeface="Courier New" panose="02070309020205020404" pitchFamily="49" charset="0"/>
+                <a:cs typeface="Courier New" panose="02070309020205020404" pitchFamily="49" charset="0"/>
+              </a:rPr>
+              <a:t>: &lt;EV</a:t>
+            </a:r>
+            <a:r>
+              <a:rPr lang="en-US" altLang="zh-HK" sz="1200" i="1" dirty="0" smtClean="0">
+                <a:latin typeface="Courier New" panose="02070309020205020404" pitchFamily="49" charset="0"/>
+                <a:cs typeface="Courier New" panose="02070309020205020404" pitchFamily="49" charset="0"/>
+              </a:rPr>
+              <a:t>+/-&gt;,</a:t>
+            </a:r>
+          </a:p>
+          <a:p>
+            <a:r>
+              <a:rPr lang="en-US" altLang="zh-HK" sz="1200" i="1" dirty="0">
+                <a:latin typeface="Courier New" panose="02070309020205020404" pitchFamily="49" charset="0"/>
+                <a:cs typeface="Courier New" panose="02070309020205020404" pitchFamily="49" charset="0"/>
+              </a:rPr>
+              <a:t> </a:t>
+            </a:r>
+            <a:r>
+              <a:rPr lang="en-US" altLang="zh-HK" sz="1200" i="1" dirty="0" smtClean="0">
+                <a:latin typeface="Courier New" panose="02070309020205020404" pitchFamily="49" charset="0"/>
+                <a:cs typeface="Courier New" panose="02070309020205020404" pitchFamily="49" charset="0"/>
+              </a:rPr>
+              <a:t>       </a:t>
+            </a:r>
+            <a:r>
+              <a:rPr lang="en-US" altLang="zh-HK" sz="1200" i="1" dirty="0" err="1" smtClean="0">
+                <a:latin typeface="Courier New" panose="02070309020205020404" pitchFamily="49" charset="0"/>
+                <a:cs typeface="Courier New" panose="02070309020205020404" pitchFamily="49" charset="0"/>
+              </a:rPr>
+              <a:t>likeCount</a:t>
+            </a:r>
+            <a:r>
+              <a:rPr lang="en-US" altLang="zh-HK" sz="1200" i="1" dirty="0" smtClean="0">
+                <a:latin typeface="Courier New" panose="02070309020205020404" pitchFamily="49" charset="0"/>
+                <a:cs typeface="Courier New" panose="02070309020205020404" pitchFamily="49" charset="0"/>
+              </a:rPr>
+              <a:t>: 2,</a:t>
+            </a:r>
+            <a:endParaRPr lang="en-US" altLang="zh-HK" sz="1200" i="1" dirty="0" smtClean="0">
+              <a:latin typeface="Courier New" panose="02070309020205020404" pitchFamily="49" charset="0"/>
+              <a:cs typeface="Courier New" panose="02070309020205020404" pitchFamily="49" charset="0"/>
+            </a:endParaRPr>
+          </a:p>
+          <a:p>
+            <a:r>
+              <a:rPr lang="en-US" altLang="zh-HK" sz="1200" i="1" dirty="0" smtClean="0">
+                <a:latin typeface="Courier New" panose="02070309020205020404" pitchFamily="49" charset="0"/>
+                <a:cs typeface="Courier New" panose="02070309020205020404" pitchFamily="49" charset="0"/>
+              </a:rPr>
+              <a:t>        </a:t>
+            </a:r>
+            <a:r>
+              <a:rPr lang="en-US" altLang="zh-HK" sz="1200" i="1" dirty="0" err="1" smtClean="0">
+                <a:latin typeface="Courier New" panose="02070309020205020404" pitchFamily="49" charset="0"/>
+                <a:cs typeface="Courier New" panose="02070309020205020404" pitchFamily="49" charset="0"/>
+              </a:rPr>
+              <a:t>likeBy</a:t>
+            </a:r>
+            <a:r>
+              <a:rPr lang="en-US" altLang="zh-HK" sz="1200" i="1" dirty="0" smtClean="0">
+                <a:latin typeface="Courier New" panose="02070309020205020404" pitchFamily="49" charset="0"/>
+                <a:cs typeface="Courier New" panose="02070309020205020404" pitchFamily="49" charset="0"/>
+              </a:rPr>
+              <a:t>: [“AA”, “tester”],</a:t>
+            </a:r>
+            <a:endParaRPr lang="en-US" altLang="zh-HK" sz="1200" dirty="0">
+              <a:latin typeface="Courier New" panose="02070309020205020404" pitchFamily="49" charset="0"/>
+              <a:cs typeface="Courier New" panose="02070309020205020404" pitchFamily="49" charset="0"/>
+            </a:endParaRPr>
+          </a:p>
+          <a:p>
+            <a:r>
+              <a:rPr lang="en-US" altLang="zh-HK" sz="1200" dirty="0" smtClean="0">
+                <a:latin typeface="Courier New" panose="02070309020205020404" pitchFamily="49" charset="0"/>
+                <a:cs typeface="Courier New" panose="02070309020205020404" pitchFamily="49" charset="0"/>
+              </a:rPr>
+              <a:t>        raw1:{filename: ”main.jpg”, ISO:100, aperture:8, shutter:”1/200”, </a:t>
+            </a:r>
+            <a:r>
+              <a:rPr lang="en-US" altLang="zh-HK" sz="1200" dirty="0">
+                <a:latin typeface="Courier New" panose="02070309020205020404" pitchFamily="49" charset="0"/>
+                <a:cs typeface="Courier New" panose="02070309020205020404" pitchFamily="49" charset="0"/>
+              </a:rPr>
+              <a:t>EV</a:t>
+            </a:r>
+            <a:r>
+              <a:rPr lang="en-US" altLang="zh-HK" sz="1200" dirty="0" smtClean="0">
+                <a:latin typeface="Courier New" panose="02070309020205020404" pitchFamily="49" charset="0"/>
+                <a:cs typeface="Courier New" panose="02070309020205020404" pitchFamily="49" charset="0"/>
+              </a:rPr>
+              <a:t>:”-2” },</a:t>
+            </a:r>
+            <a:endParaRPr lang="en-US" altLang="zh-HK" sz="1200" dirty="0">
+              <a:latin typeface="Courier New" panose="02070309020205020404" pitchFamily="49" charset="0"/>
+              <a:cs typeface="Courier New" panose="02070309020205020404" pitchFamily="49" charset="0"/>
+            </a:endParaRPr>
+          </a:p>
+          <a:p>
+            <a:r>
+              <a:rPr lang="en-US" altLang="zh-HK" sz="1200" dirty="0" smtClean="0">
+                <a:latin typeface="Courier New" panose="02070309020205020404" pitchFamily="49" charset="0"/>
+                <a:cs typeface="Courier New" panose="02070309020205020404" pitchFamily="49" charset="0"/>
+              </a:rPr>
+              <a:t>        raw2:{filename: ”overlay.jpg”, </a:t>
+            </a:r>
+            <a:r>
+              <a:rPr lang="en-US" altLang="zh-HK" sz="1200" dirty="0">
+                <a:latin typeface="Courier New" panose="02070309020205020404" pitchFamily="49" charset="0"/>
+                <a:cs typeface="Courier New" panose="02070309020205020404" pitchFamily="49" charset="0"/>
+              </a:rPr>
+              <a:t>ISO:100, aperture:8, shutter:”1/200”, EV:”-2”}</a:t>
             </a:r>
             <a:endParaRPr lang="en-US" altLang="zh-HK" sz="1200" dirty="0" smtClean="0">
               <a:latin typeface="Courier New" panose="02070309020205020404" pitchFamily="49" charset="0"/>
@@ -5455,491 +6025,7 @@
                 <a:latin typeface="Courier New" panose="02070309020205020404" pitchFamily="49" charset="0"/>
                 <a:cs typeface="Courier New" panose="02070309020205020404" pitchFamily="49" charset="0"/>
               </a:rPr>
-              <a:t>        filename</a:t>
-            </a:r>
-            <a:r>
-              <a:rPr lang="en-US" altLang="zh-HK" sz="1200" dirty="0">
-                <a:latin typeface="Courier New" panose="02070309020205020404" pitchFamily="49" charset="0"/>
-                <a:cs typeface="Courier New" panose="02070309020205020404" pitchFamily="49" charset="0"/>
-              </a:rPr>
-              <a:t>: </a:t>
-            </a:r>
-            <a:r>
-              <a:rPr lang="en-US" altLang="zh-HK" sz="1200" dirty="0" smtClean="0">
-                <a:latin typeface="Courier New" panose="02070309020205020404" pitchFamily="49" charset="0"/>
-                <a:cs typeface="Courier New" panose="02070309020205020404" pitchFamily="49" charset="0"/>
-              </a:rPr>
-              <a:t>&lt;Image Filename&gt;,</a:t>
-            </a:r>
-            <a:endParaRPr lang="en-US" altLang="zh-HK" sz="1200" dirty="0">
-              <a:latin typeface="Courier New" panose="02070309020205020404" pitchFamily="49" charset="0"/>
-              <a:cs typeface="Courier New" panose="02070309020205020404" pitchFamily="49" charset="0"/>
-            </a:endParaRPr>
-          </a:p>
-          <a:p>
-            <a:r>
-              <a:rPr lang="en-US" altLang="zh-HK" sz="1200" dirty="0">
-                <a:latin typeface="Courier New" panose="02070309020205020404" pitchFamily="49" charset="0"/>
-                <a:cs typeface="Courier New" panose="02070309020205020404" pitchFamily="49" charset="0"/>
-              </a:rPr>
-              <a:t> </a:t>
-            </a:r>
-            <a:r>
-              <a:rPr lang="en-US" altLang="zh-HK" sz="1200" dirty="0" smtClean="0">
-                <a:latin typeface="Courier New" panose="02070309020205020404" pitchFamily="49" charset="0"/>
-                <a:cs typeface="Courier New" panose="02070309020205020404" pitchFamily="49" charset="0"/>
-              </a:rPr>
-              <a:t>       ISO</a:t>
-            </a:r>
-            <a:r>
-              <a:rPr lang="en-US" altLang="zh-HK" sz="1200" dirty="0">
-                <a:latin typeface="Courier New" panose="02070309020205020404" pitchFamily="49" charset="0"/>
-                <a:cs typeface="Courier New" panose="02070309020205020404" pitchFamily="49" charset="0"/>
-              </a:rPr>
-              <a:t>: </a:t>
-            </a:r>
-            <a:r>
-              <a:rPr lang="en-US" altLang="zh-HK" sz="1200" dirty="0" smtClean="0">
-                <a:latin typeface="Courier New" panose="02070309020205020404" pitchFamily="49" charset="0"/>
-                <a:cs typeface="Courier New" panose="02070309020205020404" pitchFamily="49" charset="0"/>
-              </a:rPr>
-              <a:t>&lt;ISO&gt;,</a:t>
-            </a:r>
-          </a:p>
-          <a:p>
-            <a:r>
-              <a:rPr lang="en-US" altLang="zh-HK" sz="1200" dirty="0" smtClean="0">
-                <a:latin typeface="Courier New" panose="02070309020205020404" pitchFamily="49" charset="0"/>
-                <a:cs typeface="Courier New" panose="02070309020205020404" pitchFamily="49" charset="0"/>
-              </a:rPr>
-              <a:t>        </a:t>
-            </a:r>
-            <a:r>
-              <a:rPr lang="en-US" altLang="zh-HK" sz="1200" i="1" dirty="0" smtClean="0">
-                <a:latin typeface="Courier New" panose="02070309020205020404" pitchFamily="49" charset="0"/>
-                <a:cs typeface="Courier New" panose="02070309020205020404" pitchFamily="49" charset="0"/>
-              </a:rPr>
-              <a:t>aperture</a:t>
-            </a:r>
-            <a:r>
-              <a:rPr lang="en-US" altLang="zh-HK" sz="1200" i="1" dirty="0">
-                <a:latin typeface="Courier New" panose="02070309020205020404" pitchFamily="49" charset="0"/>
-                <a:cs typeface="Courier New" panose="02070309020205020404" pitchFamily="49" charset="0"/>
-              </a:rPr>
-              <a:t>: &lt;</a:t>
-            </a:r>
-            <a:r>
-              <a:rPr lang="en-US" altLang="zh-HK" sz="1200" i="1" dirty="0" smtClean="0">
-                <a:latin typeface="Courier New" panose="02070309020205020404" pitchFamily="49" charset="0"/>
-                <a:cs typeface="Courier New" panose="02070309020205020404" pitchFamily="49" charset="0"/>
-              </a:rPr>
-              <a:t>aperture&gt;,</a:t>
-            </a:r>
-          </a:p>
-          <a:p>
-            <a:r>
-              <a:rPr lang="en-US" altLang="zh-HK" sz="1200" i="1" dirty="0" smtClean="0">
-                <a:latin typeface="Courier New" panose="02070309020205020404" pitchFamily="49" charset="0"/>
-                <a:cs typeface="Courier New" panose="02070309020205020404" pitchFamily="49" charset="0"/>
-              </a:rPr>
-              <a:t>        shutter</a:t>
-            </a:r>
-            <a:r>
-              <a:rPr lang="en-US" altLang="zh-HK" sz="1200" i="1" dirty="0">
-                <a:latin typeface="Courier New" panose="02070309020205020404" pitchFamily="49" charset="0"/>
-                <a:cs typeface="Courier New" panose="02070309020205020404" pitchFamily="49" charset="0"/>
-              </a:rPr>
-              <a:t>: &lt;</a:t>
-            </a:r>
-            <a:r>
-              <a:rPr lang="en-US" altLang="zh-HK" sz="1200" i="1" dirty="0" smtClean="0">
-                <a:latin typeface="Courier New" panose="02070309020205020404" pitchFamily="49" charset="0"/>
-                <a:cs typeface="Courier New" panose="02070309020205020404" pitchFamily="49" charset="0"/>
-              </a:rPr>
-              <a:t>shutter&gt;,</a:t>
-            </a:r>
-          </a:p>
-          <a:p>
-            <a:r>
-              <a:rPr lang="en-US" altLang="zh-HK" sz="1200" i="1" dirty="0" smtClean="0">
-                <a:latin typeface="Courier New" panose="02070309020205020404" pitchFamily="49" charset="0"/>
-                <a:cs typeface="Courier New" panose="02070309020205020404" pitchFamily="49" charset="0"/>
-              </a:rPr>
-              <a:t>        EV: &lt;EV+/-&gt;,</a:t>
-            </a:r>
-            <a:endParaRPr lang="en-US" altLang="zh-HK" sz="1200" i="1" dirty="0">
-              <a:latin typeface="Courier New" panose="02070309020205020404" pitchFamily="49" charset="0"/>
-              <a:cs typeface="Courier New" panose="02070309020205020404" pitchFamily="49" charset="0"/>
-            </a:endParaRPr>
-          </a:p>
-          <a:p>
-            <a:r>
-              <a:rPr lang="en-US" altLang="zh-HK" sz="1200" dirty="0" smtClean="0">
-                <a:latin typeface="Courier New" panose="02070309020205020404" pitchFamily="49" charset="0"/>
-                <a:cs typeface="Courier New" panose="02070309020205020404" pitchFamily="49" charset="0"/>
-              </a:rPr>
-              <a:t>        raw1: {filename:&lt;filename&gt;, ISO:…, aperture:…, </a:t>
-            </a:r>
-            <a:r>
-              <a:rPr lang="en-US" altLang="zh-HK" sz="1200" dirty="0">
-                <a:latin typeface="Courier New" panose="02070309020205020404" pitchFamily="49" charset="0"/>
-                <a:cs typeface="Courier New" panose="02070309020205020404" pitchFamily="49" charset="0"/>
-              </a:rPr>
-              <a:t>shutter</a:t>
-            </a:r>
-            <a:r>
-              <a:rPr lang="en-US" altLang="zh-HK" sz="1200" dirty="0" smtClean="0">
-                <a:latin typeface="Courier New" panose="02070309020205020404" pitchFamily="49" charset="0"/>
-                <a:cs typeface="Courier New" panose="02070309020205020404" pitchFamily="49" charset="0"/>
-              </a:rPr>
-              <a:t>:…, </a:t>
-            </a:r>
-            <a:r>
-              <a:rPr lang="en-US" altLang="zh-HK" sz="1200" dirty="0">
-                <a:latin typeface="Courier New" panose="02070309020205020404" pitchFamily="49" charset="0"/>
-                <a:cs typeface="Courier New" panose="02070309020205020404" pitchFamily="49" charset="0"/>
-              </a:rPr>
-              <a:t>EV</a:t>
-            </a:r>
-            <a:r>
-              <a:rPr lang="en-US" altLang="zh-HK" sz="1200" dirty="0" smtClean="0">
-                <a:latin typeface="Courier New" panose="02070309020205020404" pitchFamily="49" charset="0"/>
-                <a:cs typeface="Courier New" panose="02070309020205020404" pitchFamily="49" charset="0"/>
-              </a:rPr>
-              <a:t>:… },</a:t>
-            </a:r>
-            <a:endParaRPr lang="en-US" altLang="zh-HK" sz="1200" dirty="0">
-              <a:latin typeface="Courier New" panose="02070309020205020404" pitchFamily="49" charset="0"/>
-              <a:cs typeface="Courier New" panose="02070309020205020404" pitchFamily="49" charset="0"/>
-            </a:endParaRPr>
-          </a:p>
-          <a:p>
-            <a:r>
-              <a:rPr lang="en-US" altLang="zh-HK" sz="1200" dirty="0">
-                <a:latin typeface="Courier New" panose="02070309020205020404" pitchFamily="49" charset="0"/>
-                <a:cs typeface="Courier New" panose="02070309020205020404" pitchFamily="49" charset="0"/>
-              </a:rPr>
-              <a:t> </a:t>
-            </a:r>
-            <a:r>
-              <a:rPr lang="en-US" altLang="zh-HK" sz="1200" dirty="0" smtClean="0">
-                <a:latin typeface="Courier New" panose="02070309020205020404" pitchFamily="49" charset="0"/>
-                <a:cs typeface="Courier New" panose="02070309020205020404" pitchFamily="49" charset="0"/>
-              </a:rPr>
-              <a:t>       raw2: {filename:&lt;filename</a:t>
-            </a:r>
-            <a:r>
-              <a:rPr lang="en-US" altLang="zh-HK" sz="1200" dirty="0">
-                <a:latin typeface="Courier New" panose="02070309020205020404" pitchFamily="49" charset="0"/>
-                <a:cs typeface="Courier New" panose="02070309020205020404" pitchFamily="49" charset="0"/>
-              </a:rPr>
-              <a:t>&gt;, ISO</a:t>
-            </a:r>
-            <a:r>
-              <a:rPr lang="en-US" altLang="zh-HK" sz="1200" dirty="0" smtClean="0">
-                <a:latin typeface="Courier New" panose="02070309020205020404" pitchFamily="49" charset="0"/>
-                <a:cs typeface="Courier New" panose="02070309020205020404" pitchFamily="49" charset="0"/>
-              </a:rPr>
-              <a:t>:…, </a:t>
-            </a:r>
-            <a:r>
-              <a:rPr lang="en-US" altLang="zh-HK" sz="1200" dirty="0">
-                <a:latin typeface="Courier New" panose="02070309020205020404" pitchFamily="49" charset="0"/>
-                <a:cs typeface="Courier New" panose="02070309020205020404" pitchFamily="49" charset="0"/>
-              </a:rPr>
-              <a:t>aperture</a:t>
-            </a:r>
-            <a:r>
-              <a:rPr lang="en-US" altLang="zh-HK" sz="1200" dirty="0" smtClean="0">
-                <a:latin typeface="Courier New" panose="02070309020205020404" pitchFamily="49" charset="0"/>
-                <a:cs typeface="Courier New" panose="02070309020205020404" pitchFamily="49" charset="0"/>
-              </a:rPr>
-              <a:t>:…, </a:t>
-            </a:r>
-            <a:r>
-              <a:rPr lang="en-US" altLang="zh-HK" sz="1200" dirty="0">
-                <a:latin typeface="Courier New" panose="02070309020205020404" pitchFamily="49" charset="0"/>
-                <a:cs typeface="Courier New" panose="02070309020205020404" pitchFamily="49" charset="0"/>
-              </a:rPr>
-              <a:t>shutter</a:t>
-            </a:r>
-            <a:r>
-              <a:rPr lang="en-US" altLang="zh-HK" sz="1200" dirty="0" smtClean="0">
-                <a:latin typeface="Courier New" panose="02070309020205020404" pitchFamily="49" charset="0"/>
-                <a:cs typeface="Courier New" panose="02070309020205020404" pitchFamily="49" charset="0"/>
-              </a:rPr>
-              <a:t>:…, </a:t>
-            </a:r>
-            <a:r>
-              <a:rPr lang="en-US" altLang="zh-HK" sz="1200" dirty="0">
-                <a:latin typeface="Courier New" panose="02070309020205020404" pitchFamily="49" charset="0"/>
-                <a:cs typeface="Courier New" panose="02070309020205020404" pitchFamily="49" charset="0"/>
-              </a:rPr>
-              <a:t>EV</a:t>
-            </a:r>
-            <a:r>
-              <a:rPr lang="en-US" altLang="zh-HK" sz="1200" dirty="0" smtClean="0">
-                <a:latin typeface="Courier New" panose="02070309020205020404" pitchFamily="49" charset="0"/>
-                <a:cs typeface="Courier New" panose="02070309020205020404" pitchFamily="49" charset="0"/>
-              </a:rPr>
-              <a:t>:… }</a:t>
-            </a:r>
-          </a:p>
-          <a:p>
-            <a:r>
-              <a:rPr lang="en-US" altLang="zh-HK" sz="1200" dirty="0">
-                <a:latin typeface="Courier New" panose="02070309020205020404" pitchFamily="49" charset="0"/>
-                <a:cs typeface="Courier New" panose="02070309020205020404" pitchFamily="49" charset="0"/>
-              </a:rPr>
-              <a:t> </a:t>
-            </a:r>
-            <a:r>
-              <a:rPr lang="en-US" altLang="zh-HK" sz="1200" dirty="0" smtClean="0">
-                <a:latin typeface="Courier New" panose="02070309020205020404" pitchFamily="49" charset="0"/>
-                <a:cs typeface="Courier New" panose="02070309020205020404" pitchFamily="49" charset="0"/>
-              </a:rPr>
-              <a:t>   },</a:t>
-            </a:r>
-            <a:endParaRPr lang="en-US" altLang="zh-HK" sz="1200" dirty="0">
-              <a:latin typeface="Courier New" panose="02070309020205020404" pitchFamily="49" charset="0"/>
-              <a:cs typeface="Courier New" panose="02070309020205020404" pitchFamily="49" charset="0"/>
-            </a:endParaRPr>
-          </a:p>
-          <a:p>
-            <a:r>
-              <a:rPr lang="en-US" altLang="zh-HK" sz="1200" dirty="0" smtClean="0">
-                <a:latin typeface="Courier New" panose="02070309020205020404" pitchFamily="49" charset="0"/>
-                <a:cs typeface="Courier New" panose="02070309020205020404" pitchFamily="49" charset="0"/>
-              </a:rPr>
-              <a:t>    {   </a:t>
-            </a:r>
-            <a:r>
-              <a:rPr lang="en-US" altLang="zh-HK" sz="1200" dirty="0" err="1" smtClean="0">
-                <a:latin typeface="Courier New" panose="02070309020205020404" pitchFamily="49" charset="0"/>
-                <a:cs typeface="Courier New" panose="02070309020205020404" pitchFamily="49" charset="0"/>
-              </a:rPr>
-              <a:t>login_id</a:t>
-            </a:r>
-            <a:r>
-              <a:rPr lang="en-US" altLang="zh-HK" sz="1200" dirty="0" smtClean="0">
-                <a:latin typeface="Courier New" panose="02070309020205020404" pitchFamily="49" charset="0"/>
-                <a:cs typeface="Courier New" panose="02070309020205020404" pitchFamily="49" charset="0"/>
-              </a:rPr>
-              <a:t>: “john”,</a:t>
-            </a:r>
-          </a:p>
-          <a:p>
-            <a:r>
-              <a:rPr lang="en-US" altLang="zh-HK" sz="1200" dirty="0">
-                <a:latin typeface="Courier New" panose="02070309020205020404" pitchFamily="49" charset="0"/>
-                <a:cs typeface="Courier New" panose="02070309020205020404" pitchFamily="49" charset="0"/>
-              </a:rPr>
-              <a:t> </a:t>
-            </a:r>
-            <a:r>
-              <a:rPr lang="en-US" altLang="zh-HK" sz="1200" dirty="0" smtClean="0">
-                <a:latin typeface="Courier New" panose="02070309020205020404" pitchFamily="49" charset="0"/>
-                <a:cs typeface="Courier New" panose="02070309020205020404" pitchFamily="49" charset="0"/>
-              </a:rPr>
-              <a:t>       filename</a:t>
-            </a:r>
-            <a:r>
-              <a:rPr lang="en-US" altLang="zh-HK" sz="1200" dirty="0">
-                <a:latin typeface="Courier New" panose="02070309020205020404" pitchFamily="49" charset="0"/>
-                <a:cs typeface="Courier New" panose="02070309020205020404" pitchFamily="49" charset="0"/>
-              </a:rPr>
-              <a:t>: </a:t>
-            </a:r>
-            <a:r>
-              <a:rPr lang="en-US" altLang="zh-HK" sz="1200" dirty="0" smtClean="0">
-                <a:latin typeface="Courier New" panose="02070309020205020404" pitchFamily="49" charset="0"/>
-                <a:cs typeface="Courier New" panose="02070309020205020404" pitchFamily="49" charset="0"/>
-              </a:rPr>
-              <a:t>“scene.jpg”,</a:t>
-            </a:r>
-            <a:endParaRPr lang="en-US" altLang="zh-HK" sz="1200" dirty="0">
-              <a:latin typeface="Courier New" panose="02070309020205020404" pitchFamily="49" charset="0"/>
-              <a:cs typeface="Courier New" panose="02070309020205020404" pitchFamily="49" charset="0"/>
-            </a:endParaRPr>
-          </a:p>
-          <a:p>
-            <a:r>
-              <a:rPr lang="en-US" altLang="zh-HK" sz="1200" dirty="0" smtClean="0">
-                <a:latin typeface="Courier New" panose="02070309020205020404" pitchFamily="49" charset="0"/>
-                <a:cs typeface="Courier New" panose="02070309020205020404" pitchFamily="49" charset="0"/>
-              </a:rPr>
-              <a:t>        ISO: 100,</a:t>
-            </a:r>
-          </a:p>
-          <a:p>
-            <a:r>
-              <a:rPr lang="en-US" altLang="zh-HK" sz="1200" dirty="0" smtClean="0">
-                <a:latin typeface="Courier New" panose="02070309020205020404" pitchFamily="49" charset="0"/>
-                <a:cs typeface="Courier New" panose="02070309020205020404" pitchFamily="49" charset="0"/>
-              </a:rPr>
-              <a:t>        </a:t>
-            </a:r>
-            <a:r>
-              <a:rPr lang="en-US" altLang="zh-HK" sz="1200" i="1" dirty="0" smtClean="0">
-                <a:latin typeface="Courier New" panose="02070309020205020404" pitchFamily="49" charset="0"/>
-                <a:cs typeface="Courier New" panose="02070309020205020404" pitchFamily="49" charset="0"/>
-              </a:rPr>
-              <a:t>aperture</a:t>
-            </a:r>
-            <a:r>
-              <a:rPr lang="en-US" altLang="zh-HK" sz="1200" i="1" dirty="0">
-                <a:latin typeface="Courier New" panose="02070309020205020404" pitchFamily="49" charset="0"/>
-                <a:cs typeface="Courier New" panose="02070309020205020404" pitchFamily="49" charset="0"/>
-              </a:rPr>
-              <a:t>: </a:t>
-            </a:r>
-            <a:r>
-              <a:rPr lang="en-US" altLang="zh-HK" sz="1200" i="1" dirty="0" smtClean="0">
-                <a:latin typeface="Courier New" panose="02070309020205020404" pitchFamily="49" charset="0"/>
-                <a:cs typeface="Courier New" panose="02070309020205020404" pitchFamily="49" charset="0"/>
-              </a:rPr>
-              <a:t>8,</a:t>
-            </a:r>
-            <a:endParaRPr lang="en-US" altLang="zh-HK" sz="1200" i="1" dirty="0">
-              <a:latin typeface="Courier New" panose="02070309020205020404" pitchFamily="49" charset="0"/>
-              <a:cs typeface="Courier New" panose="02070309020205020404" pitchFamily="49" charset="0"/>
-            </a:endParaRPr>
-          </a:p>
-          <a:p>
-            <a:r>
-              <a:rPr lang="en-US" altLang="zh-HK" sz="1200" i="1" dirty="0" smtClean="0">
-                <a:latin typeface="Courier New" panose="02070309020205020404" pitchFamily="49" charset="0"/>
-                <a:cs typeface="Courier New" panose="02070309020205020404" pitchFamily="49" charset="0"/>
-              </a:rPr>
-              <a:t>        shutter</a:t>
-            </a:r>
-            <a:r>
-              <a:rPr lang="en-US" altLang="zh-HK" sz="1200" i="1" dirty="0">
-                <a:latin typeface="Courier New" panose="02070309020205020404" pitchFamily="49" charset="0"/>
-                <a:cs typeface="Courier New" panose="02070309020205020404" pitchFamily="49" charset="0"/>
-              </a:rPr>
-              <a:t>: </a:t>
-            </a:r>
-            <a:r>
-              <a:rPr lang="en-US" altLang="zh-HK" sz="1200" dirty="0" smtClean="0">
-                <a:latin typeface="Courier New" panose="02070309020205020404" pitchFamily="49" charset="0"/>
-                <a:cs typeface="Courier New" panose="02070309020205020404" pitchFamily="49" charset="0"/>
-              </a:rPr>
-              <a:t>“1</a:t>
-            </a:r>
-            <a:r>
-              <a:rPr lang="en-US" altLang="zh-HK" sz="1200" i="1" dirty="0" smtClean="0">
-                <a:latin typeface="Courier New" panose="02070309020205020404" pitchFamily="49" charset="0"/>
-                <a:cs typeface="Courier New" panose="02070309020205020404" pitchFamily="49" charset="0"/>
-              </a:rPr>
-              <a:t>/200”,</a:t>
-            </a:r>
-            <a:endParaRPr lang="en-US" altLang="zh-HK" sz="1200" i="1" dirty="0">
-              <a:latin typeface="Courier New" panose="02070309020205020404" pitchFamily="49" charset="0"/>
-              <a:cs typeface="Courier New" panose="02070309020205020404" pitchFamily="49" charset="0"/>
-            </a:endParaRPr>
-          </a:p>
-          <a:p>
-            <a:r>
-              <a:rPr lang="en-US" altLang="zh-HK" sz="1200" i="1" dirty="0" smtClean="0">
-                <a:latin typeface="Courier New" panose="02070309020205020404" pitchFamily="49" charset="0"/>
-                <a:cs typeface="Courier New" panose="02070309020205020404" pitchFamily="49" charset="0"/>
-              </a:rPr>
-              <a:t>        EV</a:t>
-            </a:r>
-            <a:r>
-              <a:rPr lang="en-US" altLang="zh-HK" sz="1200" i="1" dirty="0">
-                <a:latin typeface="Courier New" panose="02070309020205020404" pitchFamily="49" charset="0"/>
-                <a:cs typeface="Courier New" panose="02070309020205020404" pitchFamily="49" charset="0"/>
-              </a:rPr>
-              <a:t>: &lt;EV</a:t>
-            </a:r>
-            <a:r>
-              <a:rPr lang="en-US" altLang="zh-HK" sz="1200" i="1" dirty="0" smtClean="0">
-                <a:latin typeface="Courier New" panose="02070309020205020404" pitchFamily="49" charset="0"/>
-                <a:cs typeface="Courier New" panose="02070309020205020404" pitchFamily="49" charset="0"/>
-              </a:rPr>
-              <a:t>+/-&gt;,</a:t>
-            </a:r>
-            <a:endParaRPr lang="en-US" altLang="zh-HK" sz="1200" dirty="0">
-              <a:latin typeface="Courier New" panose="02070309020205020404" pitchFamily="49" charset="0"/>
-              <a:cs typeface="Courier New" panose="02070309020205020404" pitchFamily="49" charset="0"/>
-            </a:endParaRPr>
-          </a:p>
-          <a:p>
-            <a:r>
-              <a:rPr lang="en-US" altLang="zh-HK" sz="1200" dirty="0" smtClean="0">
-                <a:latin typeface="Courier New" panose="02070309020205020404" pitchFamily="49" charset="0"/>
-                <a:cs typeface="Courier New" panose="02070309020205020404" pitchFamily="49" charset="0"/>
-              </a:rPr>
-              <a:t>        raw1:{filename: ”main.jpg”, ISO:100, aperture:8, shutter:”1/200”, </a:t>
-            </a:r>
-            <a:r>
-              <a:rPr lang="en-US" altLang="zh-HK" sz="1200" dirty="0">
-                <a:latin typeface="Courier New" panose="02070309020205020404" pitchFamily="49" charset="0"/>
-                <a:cs typeface="Courier New" panose="02070309020205020404" pitchFamily="49" charset="0"/>
-              </a:rPr>
-              <a:t>EV</a:t>
-            </a:r>
-            <a:r>
-              <a:rPr lang="en-US" altLang="zh-HK" sz="1200" dirty="0" smtClean="0">
-                <a:latin typeface="Courier New" panose="02070309020205020404" pitchFamily="49" charset="0"/>
-                <a:cs typeface="Courier New" panose="02070309020205020404" pitchFamily="49" charset="0"/>
-              </a:rPr>
-              <a:t>:”-2” },</a:t>
-            </a:r>
-            <a:endParaRPr lang="en-US" altLang="zh-HK" sz="1200" dirty="0">
-              <a:latin typeface="Courier New" panose="02070309020205020404" pitchFamily="49" charset="0"/>
-              <a:cs typeface="Courier New" panose="02070309020205020404" pitchFamily="49" charset="0"/>
-            </a:endParaRPr>
-          </a:p>
-          <a:p>
-            <a:r>
-              <a:rPr lang="en-US" altLang="zh-HK" sz="1200" dirty="0" smtClean="0">
-                <a:latin typeface="Courier New" panose="02070309020205020404" pitchFamily="49" charset="0"/>
-                <a:cs typeface="Courier New" panose="02070309020205020404" pitchFamily="49" charset="0"/>
-              </a:rPr>
-              <a:t>        raw2:{filename: ”overlay.jpg”, </a:t>
-            </a:r>
-            <a:r>
-              <a:rPr lang="en-US" altLang="zh-HK" sz="1200" dirty="0">
-                <a:latin typeface="Courier New" panose="02070309020205020404" pitchFamily="49" charset="0"/>
-                <a:cs typeface="Courier New" panose="02070309020205020404" pitchFamily="49" charset="0"/>
-              </a:rPr>
-              <a:t>ISO:100, aperture:8, shutter:”1/200”, EV:”-2”}</a:t>
-            </a:r>
-            <a:endParaRPr lang="en-US" altLang="zh-HK" sz="1200" dirty="0" smtClean="0">
-              <a:latin typeface="Courier New" panose="02070309020205020404" pitchFamily="49" charset="0"/>
-              <a:cs typeface="Courier New" panose="02070309020205020404" pitchFamily="49" charset="0"/>
-            </a:endParaRPr>
-          </a:p>
-          <a:p>
-            <a:r>
-              <a:rPr lang="en-US" altLang="zh-HK" sz="1200" dirty="0">
-                <a:latin typeface="Courier New" panose="02070309020205020404" pitchFamily="49" charset="0"/>
-                <a:cs typeface="Courier New" panose="02070309020205020404" pitchFamily="49" charset="0"/>
-              </a:rPr>
-              <a:t> </a:t>
-            </a:r>
-            <a:r>
-              <a:rPr lang="en-US" altLang="zh-HK" sz="1200" dirty="0" smtClean="0">
-                <a:latin typeface="Courier New" panose="02070309020205020404" pitchFamily="49" charset="0"/>
-                <a:cs typeface="Courier New" panose="02070309020205020404" pitchFamily="49" charset="0"/>
-              </a:rPr>
-              <a:t>   }</a:t>
-            </a:r>
-            <a:endParaRPr lang="en-US" altLang="zh-HK" sz="1200" dirty="0">
-              <a:latin typeface="Courier New" panose="02070309020205020404" pitchFamily="49" charset="0"/>
-              <a:cs typeface="Courier New" panose="02070309020205020404" pitchFamily="49" charset="0"/>
-            </a:endParaRPr>
-          </a:p>
-          <a:p>
-            <a:r>
-              <a:rPr lang="en-US" altLang="zh-HK" sz="1200" dirty="0" smtClean="0">
-                <a:latin typeface="Courier New" panose="02070309020205020404" pitchFamily="49" charset="0"/>
-                <a:cs typeface="Courier New" panose="02070309020205020404" pitchFamily="49" charset="0"/>
-              </a:rPr>
-              <a:t>}</a:t>
+              <a:t>}   }</a:t>
             </a:r>
             <a:endParaRPr lang="zh-HK" altLang="en-US" sz="1200" dirty="0">
               <a:latin typeface="Courier New" panose="02070309020205020404" pitchFamily="49" charset="0"/>
@@ -5956,7 +6042,7 @@
         </p:nvSpPr>
         <p:spPr>
           <a:xfrm>
-            <a:off x="251520" y="404664"/>
+            <a:off x="251520" y="116632"/>
             <a:ext cx="2376264" cy="400110"/>
           </a:xfrm>
           <a:prstGeom prst="rect">
@@ -5986,7 +6072,7 @@
         </p:nvSpPr>
         <p:spPr>
           <a:xfrm>
-            <a:off x="251520" y="980728"/>
+            <a:off x="251520" y="570166"/>
             <a:ext cx="2502032" cy="338554"/>
           </a:xfrm>
           <a:prstGeom prst="rect">

</xml_diff>